<commit_message>
Fixed pictures--jetzt formatiere ich ein paar sachen.
</commit_message>
<xml_diff>
--- a/Wang-Müller.pptx
+++ b/Wang-Müller.pptx
@@ -213,7 +213,7 @@
           <a:p>
             <a:fld id="{6A449840-315F-4FD4-A955-B6C99BE65166}" type="datetimeFigureOut">
               <a:rPr lang="de-DE" smtClean="0"/>
-              <a:t>02.07.2015</a:t>
+              <a:t>03.07.2015</a:t>
             </a:fld>
             <a:endParaRPr lang="de-DE"/>
           </a:p>
@@ -372,7 +372,7 @@
           <a:p>
             <a:fld id="{94626CDE-96AB-47F3-83F8-702B4FAB0956}" type="slidenum">
               <a:rPr lang="de-DE" smtClean="0"/>
-              <a:t>‹Nr.›</a:t>
+              <a:t>‹#›</a:t>
             </a:fld>
             <a:endParaRPr lang="de-DE"/>
           </a:p>
@@ -1789,7 +1789,7 @@
           <a:p>
             <a:fld id="{2CE4E6E9-A8D3-4EFD-B6E5-8FAD5746A6FF}" type="datetime1">
               <a:rPr lang="en-US" smtClean="0"/>
-              <a:t>7/2/2015</a:t>
+              <a:t>3/7/2015</a:t>
             </a:fld>
             <a:endParaRPr lang="en-US"/>
           </a:p>
@@ -2024,7 +2024,7 @@
           <a:p>
             <a:fld id="{3A74BF67-7FCA-47E9-A5B6-F501EFF78D2D}" type="datetime1">
               <a:rPr lang="en-US" smtClean="0"/>
-              <a:t>7/2/2015</a:t>
+              <a:t>3/7/2015</a:t>
             </a:fld>
             <a:endParaRPr lang="en-US"/>
           </a:p>
@@ -2066,7 +2066,7 @@
           <a:p>
             <a:fld id="{5B99597B-07E3-4F78-AC35-69A9544D51AD}" type="slidenum">
               <a:rPr lang="en-US" smtClean="0"/>
-              <a:t>‹Nr.›</a:t>
+              <a:t>‹#›</a:t>
             </a:fld>
             <a:endParaRPr lang="en-US"/>
           </a:p>
@@ -2338,7 +2338,7 @@
           <a:p>
             <a:fld id="{78E946C9-0300-47E7-B4AB-F2B5ED6A6A10}" type="datetime1">
               <a:rPr lang="en-US" smtClean="0"/>
-              <a:t>7/2/2015</a:t>
+              <a:t>3/7/2015</a:t>
             </a:fld>
             <a:endParaRPr lang="en-US"/>
           </a:p>
@@ -2380,7 +2380,7 @@
           <a:p>
             <a:fld id="{5B99597B-07E3-4F78-AC35-69A9544D51AD}" type="slidenum">
               <a:rPr lang="en-US" smtClean="0"/>
-              <a:t>‹Nr.›</a:t>
+              <a:t>‹#›</a:t>
             </a:fld>
             <a:endParaRPr lang="en-US"/>
           </a:p>
@@ -2679,7 +2679,7 @@
           <a:p>
             <a:fld id="{36174F5A-B9AE-442B-8E0C-362A74397D13}" type="datetime1">
               <a:rPr lang="en-US" smtClean="0"/>
-              <a:t>7/2/2015</a:t>
+              <a:t>3/7/2015</a:t>
             </a:fld>
             <a:endParaRPr lang="en-US"/>
           </a:p>
@@ -2721,7 +2721,7 @@
           <a:p>
             <a:fld id="{5B99597B-07E3-4F78-AC35-69A9544D51AD}" type="slidenum">
               <a:rPr lang="en-US" smtClean="0"/>
-              <a:t>‹Nr.›</a:t>
+              <a:t>‹#›</a:t>
             </a:fld>
             <a:endParaRPr lang="en-US"/>
           </a:p>
@@ -2993,7 +2993,7 @@
           <a:p>
             <a:fld id="{C4E46709-CBC1-4562-A2E6-AEF7E87EC09A}" type="datetime1">
               <a:rPr lang="en-US" smtClean="0"/>
-              <a:t>7/2/2015</a:t>
+              <a:t>3/7/2015</a:t>
             </a:fld>
             <a:endParaRPr lang="en-US"/>
           </a:p>
@@ -3035,7 +3035,7 @@
           <a:p>
             <a:fld id="{5B99597B-07E3-4F78-AC35-69A9544D51AD}" type="slidenum">
               <a:rPr lang="en-US" smtClean="0"/>
-              <a:t>‹Nr.›</a:t>
+              <a:t>‹#›</a:t>
             </a:fld>
             <a:endParaRPr lang="en-US"/>
           </a:p>
@@ -3386,7 +3386,7 @@
           <a:p>
             <a:fld id="{8F0F8E5B-BA6E-4CC4-A63F-C3AF07145EEC}" type="datetime1">
               <a:rPr lang="en-US" smtClean="0"/>
-              <a:t>7/2/2015</a:t>
+              <a:t>3/7/2015</a:t>
             </a:fld>
             <a:endParaRPr lang="en-US"/>
           </a:p>
@@ -3428,7 +3428,7 @@
           <a:p>
             <a:fld id="{5B99597B-07E3-4F78-AC35-69A9544D51AD}" type="slidenum">
               <a:rPr lang="en-US" smtClean="0"/>
-              <a:t>‹Nr.›</a:t>
+              <a:t>‹#›</a:t>
             </a:fld>
             <a:endParaRPr lang="en-US"/>
           </a:p>
@@ -3556,7 +3556,7 @@
           <a:p>
             <a:fld id="{72687BDB-B586-4D7C-B658-35F9D1B217F1}" type="datetime1">
               <a:rPr lang="en-US" smtClean="0"/>
-              <a:t>7/2/2015</a:t>
+              <a:t>3/7/2015</a:t>
             </a:fld>
             <a:endParaRPr lang="en-US"/>
           </a:p>
@@ -3598,7 +3598,7 @@
           <a:p>
             <a:fld id="{5B99597B-07E3-4F78-AC35-69A9544D51AD}" type="slidenum">
               <a:rPr lang="en-US" smtClean="0"/>
-              <a:t>‹Nr.›</a:t>
+              <a:t>‹#›</a:t>
             </a:fld>
             <a:endParaRPr lang="en-US"/>
           </a:p>
@@ -3736,7 +3736,7 @@
           <a:p>
             <a:fld id="{D359E52B-A2A0-4A6B-ADF1-8830B4851C09}" type="datetime1">
               <a:rPr lang="en-US" smtClean="0"/>
-              <a:t>7/2/2015</a:t>
+              <a:t>3/7/2015</a:t>
             </a:fld>
             <a:endParaRPr lang="en-US"/>
           </a:p>
@@ -3778,7 +3778,7 @@
           <a:p>
             <a:fld id="{5B99597B-07E3-4F78-AC35-69A9544D51AD}" type="slidenum">
               <a:rPr lang="en-US" smtClean="0"/>
-              <a:t>‹Nr.›</a:t>
+              <a:t>‹#›</a:t>
             </a:fld>
             <a:endParaRPr lang="en-US"/>
           </a:p>
@@ -3919,7 +3919,7 @@
           <a:p>
             <a:fld id="{A896EC0E-555A-40A9-B69D-D5228A02F840}" type="datetime1">
               <a:rPr lang="en-US" smtClean="0"/>
-              <a:t>7/2/2015</a:t>
+              <a:t>3/7/2015</a:t>
             </a:fld>
             <a:endParaRPr lang="en-US"/>
           </a:p>
@@ -3962,7 +3962,7 @@
             <a:fld id="{5B99597B-07E3-4F78-AC35-69A9544D51AD}" type="slidenum">
               <a:rPr lang="en-US" smtClean="0"/>
               <a:pPr/>
-              <a:t>‹Nr.›</a:t>
+              <a:t>‹#›</a:t>
             </a:fld>
             <a:r>
               <a:rPr lang="en-US" dirty="0" smtClean="0"/>
@@ -4178,7 +4178,7 @@
           <a:p>
             <a:fld id="{1770B8A0-D34B-4FA5-B93E-24DA761A968A}" type="datetime1">
               <a:rPr lang="en-US" smtClean="0"/>
-              <a:t>7/2/2015</a:t>
+              <a:t>3/7/2015</a:t>
             </a:fld>
             <a:endParaRPr lang="en-US"/>
           </a:p>
@@ -4220,7 +4220,7 @@
           <a:p>
             <a:fld id="{5B99597B-07E3-4F78-AC35-69A9544D51AD}" type="slidenum">
               <a:rPr lang="en-US" smtClean="0"/>
-              <a:t>‹Nr.›</a:t>
+              <a:t>‹#›</a:t>
             </a:fld>
             <a:endParaRPr lang="en-US"/>
           </a:p>
@@ -4417,7 +4417,7 @@
           <a:p>
             <a:fld id="{1EED6501-03F8-410C-AF14-B1A376829DEC}" type="datetime1">
               <a:rPr lang="en-US" smtClean="0"/>
-              <a:t>7/2/2015</a:t>
+              <a:t>3/7/2015</a:t>
             </a:fld>
             <a:endParaRPr lang="en-US"/>
           </a:p>
@@ -4459,7 +4459,7 @@
           <a:p>
             <a:fld id="{5B99597B-07E3-4F78-AC35-69A9544D51AD}" type="slidenum">
               <a:rPr lang="en-US" smtClean="0"/>
-              <a:t>‹Nr.›</a:t>
+              <a:t>‹#›</a:t>
             </a:fld>
             <a:endParaRPr lang="en-US"/>
           </a:p>
@@ -4791,7 +4791,7 @@
           <a:p>
             <a:fld id="{717F26B0-4A12-4513-A216-AD2841158341}" type="datetime1">
               <a:rPr lang="en-US" smtClean="0"/>
-              <a:t>7/2/2015</a:t>
+              <a:t>3/7/2015</a:t>
             </a:fld>
             <a:endParaRPr lang="en-US"/>
           </a:p>
@@ -4833,7 +4833,7 @@
           <a:p>
             <a:fld id="{5B99597B-07E3-4F78-AC35-69A9544D51AD}" type="slidenum">
               <a:rPr lang="en-US" smtClean="0"/>
-              <a:t>‹Nr.›</a:t>
+              <a:t>‹#›</a:t>
             </a:fld>
             <a:endParaRPr lang="en-US"/>
           </a:p>
@@ -4914,7 +4914,7 @@
           <a:p>
             <a:fld id="{55EA2914-6F61-4473-BDB1-38AB32F358A3}" type="datetime1">
               <a:rPr lang="en-US" smtClean="0"/>
-              <a:t>7/2/2015</a:t>
+              <a:t>3/7/2015</a:t>
             </a:fld>
             <a:endParaRPr lang="en-US"/>
           </a:p>
@@ -4956,7 +4956,7 @@
           <a:p>
             <a:fld id="{5B99597B-07E3-4F78-AC35-69A9544D51AD}" type="slidenum">
               <a:rPr lang="en-US" smtClean="0"/>
-              <a:t>‹Nr.›</a:t>
+              <a:t>‹#›</a:t>
             </a:fld>
             <a:endParaRPr lang="en-US"/>
           </a:p>
@@ -5009,7 +5009,7 @@
           <a:p>
             <a:fld id="{AB97AA6C-032C-4064-A787-9F610791F4AF}" type="datetime1">
               <a:rPr lang="en-US" smtClean="0"/>
-              <a:t>7/2/2015</a:t>
+              <a:t>3/7/2015</a:t>
             </a:fld>
             <a:endParaRPr lang="en-US"/>
           </a:p>
@@ -5051,7 +5051,7 @@
           <a:p>
             <a:fld id="{5B99597B-07E3-4F78-AC35-69A9544D51AD}" type="slidenum">
               <a:rPr lang="en-US" smtClean="0"/>
-              <a:t>‹Nr.›</a:t>
+              <a:t>‹#›</a:t>
             </a:fld>
             <a:endParaRPr lang="en-US"/>
           </a:p>
@@ -5264,7 +5264,7 @@
           <a:p>
             <a:fld id="{2F1E71C1-AFE5-4F5C-A429-92741E987410}" type="datetime1">
               <a:rPr lang="en-US" smtClean="0"/>
-              <a:t>7/2/2015</a:t>
+              <a:t>3/7/2015</a:t>
             </a:fld>
             <a:endParaRPr lang="en-US"/>
           </a:p>
@@ -5306,7 +5306,7 @@
           <a:p>
             <a:fld id="{5B99597B-07E3-4F78-AC35-69A9544D51AD}" type="slidenum">
               <a:rPr lang="en-US" smtClean="0"/>
-              <a:t>‹Nr.›</a:t>
+              <a:t>‹#›</a:t>
             </a:fld>
             <a:endParaRPr lang="en-US"/>
           </a:p>
@@ -5527,7 +5527,7 @@
           <a:p>
             <a:fld id="{EAD9C191-BEE7-4102-8593-B3B8770435DF}" type="datetime1">
               <a:rPr lang="en-US" smtClean="0"/>
-              <a:t>7/2/2015</a:t>
+              <a:t>3/7/2015</a:t>
             </a:fld>
             <a:endParaRPr lang="en-US"/>
           </a:p>
@@ -5569,7 +5569,7 @@
           <a:p>
             <a:fld id="{5B99597B-07E3-4F78-AC35-69A9544D51AD}" type="slidenum">
               <a:rPr lang="en-US" smtClean="0"/>
-              <a:t>‹Nr.›</a:t>
+              <a:t>‹#›</a:t>
             </a:fld>
             <a:endParaRPr lang="en-US"/>
           </a:p>
@@ -6270,7 +6270,7 @@
           <a:p>
             <a:fld id="{CDCE79DA-BB38-4EB2-97E1-81BA7E2A9CA8}" type="datetime1">
               <a:rPr lang="en-US" smtClean="0"/>
-              <a:t>7/2/2015</a:t>
+              <a:t>3/7/2015</a:t>
             </a:fld>
             <a:endParaRPr lang="en-US"/>
           </a:p>
@@ -6347,7 +6347,7 @@
             <a:fld id="{5B99597B-07E3-4F78-AC35-69A9544D51AD}" type="slidenum">
               <a:rPr lang="en-US" smtClean="0"/>
               <a:pPr/>
-              <a:t>‹Nr.›</a:t>
+              <a:t>‹#›</a:t>
             </a:fld>
             <a:r>
               <a:rPr lang="en-US" dirty="0" smtClean="0"/>
@@ -10935,12 +10935,13 @@
               </a:ext>
             </a:extLst>
           </a:blip>
+          <a:srcRect l="1" t="11194" r="54545" b="40298"/>
           <a:stretch/>
         </p:blipFill>
         <p:spPr>
           <a:xfrm>
-            <a:off x="1524168" y="2160588"/>
-            <a:ext cx="6903701" cy="3881437"/>
+            <a:off x="188922" y="2165927"/>
+            <a:ext cx="4572000" cy="2743200"/>
           </a:xfrm>
         </p:spPr>
       </p:pic>
@@ -10965,7 +10966,7 @@
         </p:blipFill>
         <p:spPr>
           <a:xfrm>
-            <a:off x="1223889" y="2646399"/>
+            <a:off x="5145346" y="2165927"/>
             <a:ext cx="4572000" cy="2743200"/>
           </a:xfrm>
           <a:prstGeom prst="rect">
@@ -11079,12 +11080,13 @@
               </a:ext>
             </a:extLst>
           </a:blip>
+          <a:srcRect l="44589" t="51375" r="20274" b="11125"/>
           <a:stretch/>
         </p:blipFill>
         <p:spPr>
           <a:xfrm>
-            <a:off x="1524168" y="2160588"/>
-            <a:ext cx="6903701" cy="3881437"/>
+            <a:off x="192024" y="2167128"/>
+            <a:ext cx="4572000" cy="2743200"/>
           </a:xfrm>
         </p:spPr>
       </p:pic>
@@ -11109,7 +11111,7 @@
         </p:blipFill>
         <p:spPr>
           <a:xfrm>
-            <a:off x="1223889" y="2646399"/>
+            <a:off x="5148072" y="2167128"/>
             <a:ext cx="4572000" cy="2743200"/>
           </a:xfrm>
           <a:prstGeom prst="rect">
@@ -11223,7 +11225,7 @@
         </p:blipFill>
         <p:spPr>
           <a:xfrm>
-            <a:off x="429485" y="2125272"/>
+            <a:off x="484905" y="2097853"/>
             <a:ext cx="8844516" cy="3157839"/>
           </a:xfrm>
           <a:prstGeom prst="rect">
@@ -11604,13 +11606,8 @@
             </a:r>
             <a:r>
               <a:rPr lang="de-DE" noProof="0" dirty="0" smtClean="0"/>
-              <a:t>nicht </a:t>
-            </a:r>
-            <a:r>
-              <a:rPr lang="de-DE" noProof="0" dirty="0" smtClean="0"/>
-              <a:t>Eckpunkten</a:t>
-            </a:r>
-            <a:endParaRPr lang="de-DE" noProof="0" dirty="0" smtClean="0"/>
+              <a:t>nicht Eckpunkten</a:t>
+            </a:r>
           </a:p>
           <a:p>
             <a:endParaRPr lang="de-DE" noProof="0" dirty="0"/>
@@ -11730,31 +11727,7 @@
             </a:r>
             <a:r>
               <a:rPr lang="de-DE" noProof="0" dirty="0" smtClean="0"/>
-              <a:t> ist ein Intervall auf dem </a:t>
-            </a:r>
-            <a:r>
-              <a:rPr lang="de-DE" noProof="0" dirty="0" smtClean="0"/>
-              <a:t>Linienzug, das von </a:t>
-            </a:r>
-            <a:r>
-              <a:rPr lang="de-DE" noProof="0" dirty="0" smtClean="0"/>
-              <a:t>zwei Wendepunkten </a:t>
-            </a:r>
-            <a:r>
-              <a:rPr lang="de-DE" noProof="0" dirty="0" smtClean="0"/>
-              <a:t>begrenzt wird </a:t>
-            </a:r>
-            <a:r>
-              <a:rPr lang="de-DE" noProof="0" dirty="0" smtClean="0"/>
-              <a:t>und </a:t>
-            </a:r>
-            <a:r>
-              <a:rPr lang="de-DE" noProof="0" dirty="0" smtClean="0"/>
-              <a:t>keine weiteren Wendepunkte </a:t>
-            </a:r>
-            <a:r>
-              <a:rPr lang="de-DE" noProof="0" dirty="0" smtClean="0"/>
-              <a:t>enthält</a:t>
+              <a:t> ist ein Intervall auf dem Linienzug, das von zwei Wendepunkten begrenzt wird und keine weiteren Wendepunkte enthält</a:t>
             </a:r>
           </a:p>
           <a:p>
@@ -12522,8 +12495,8 @@
           </a:p>
         </p:txBody>
       </p:sp>
-      <mc:AlternateContent xmlns:mc="http://schemas.openxmlformats.org/markup-compatibility/2006">
-        <mc:Choice xmlns:a14="http://schemas.microsoft.com/office/drawing/2010/main" Requires="a14">
+      <mc:AlternateContent xmlns:mc="http://schemas.openxmlformats.org/markup-compatibility/2006" xmlns:a14="http://schemas.microsoft.com/office/drawing/2010/main">
+        <mc:Choice Requires="a14">
           <p:sp>
             <p:nvSpPr>
               <p:cNvPr id="3" name="Content Placeholder 2"/>
@@ -12553,11 +12526,7 @@
                 </a:r>
                 <a:r>
                   <a:rPr lang="de-DE" dirty="0" smtClean="0"/>
-                  <a:t>ist die euklidische Distanz zwischen </a:t>
-                </a:r>
-                <a:r>
-                  <a:rPr lang="de-DE" dirty="0" smtClean="0"/>
-                  <a:t>zwei </a:t>
+                  <a:t>ist die euklidische Distanz zwischen zwei </a:t>
                 </a:r>
                 <a:r>
                   <a:rPr lang="de-DE" dirty="0" err="1" smtClean="0"/>
@@ -12805,7 +12774,7 @@
             </p:txBody>
           </p:sp>
         </mc:Choice>
-        <mc:Fallback>
+        <mc:Fallback xmlns="">
           <p:sp>
             <p:nvSpPr>
               <p:cNvPr id="3" name="Content Placeholder 2"/>
@@ -13029,11 +12998,7 @@
             </a:r>
             <a:r>
               <a:rPr lang="de-DE" sz="1400" dirty="0" smtClean="0"/>
-              <a:t> </a:t>
-            </a:r>
-            <a:r>
-              <a:rPr lang="de-DE" sz="1400" dirty="0" smtClean="0"/>
-              <a:t>zu groß?</a:t>
+              <a:t> zu groß?</a:t>
             </a:r>
             <a:endParaRPr lang="de-DE" sz="1400" dirty="0"/>
           </a:p>

</xml_diff>